<commit_message>
Cluster Update Präsi fertig
</commit_message>
<xml_diff>
--- a/Ausarbeitung/IsingModell.pptx
+++ b/Ausarbeitung/IsingModell.pptx
@@ -5,7 +5,7 @@
     <p:sldMasterId id="2147483648" r:id="rId1"/>
   </p:sldMasterIdLst>
   <p:notesMasterIdLst>
-    <p:notesMasterId r:id="rId18"/>
+    <p:notesMasterId r:id="rId22"/>
   </p:notesMasterIdLst>
   <p:sldIdLst>
     <p:sldId id="256" r:id="rId2"/>
@@ -20,10 +20,14 @@
     <p:sldId id="266" r:id="rId11"/>
     <p:sldId id="268" r:id="rId12"/>
     <p:sldId id="269" r:id="rId13"/>
-    <p:sldId id="270" r:id="rId14"/>
-    <p:sldId id="262" r:id="rId15"/>
-    <p:sldId id="271" r:id="rId16"/>
-    <p:sldId id="272" r:id="rId17"/>
+    <p:sldId id="277" r:id="rId14"/>
+    <p:sldId id="270" r:id="rId15"/>
+    <p:sldId id="262" r:id="rId16"/>
+    <p:sldId id="274" r:id="rId17"/>
+    <p:sldId id="271" r:id="rId18"/>
+    <p:sldId id="272" r:id="rId19"/>
+    <p:sldId id="275" r:id="rId20"/>
+    <p:sldId id="276" r:id="rId21"/>
   </p:sldIdLst>
   <p:sldSz cx="9144000" cy="6858000" type="screen4x3"/>
   <p:notesSz cx="6858000" cy="9144000"/>
@@ -4287,6 +4291,50 @@
       </p:grpSpPr>
       <p:sp>
         <p:nvSpPr>
+          <p:cNvPr id="3" name="Inhaltsplatzhalter 2"/>
+          <p:cNvSpPr>
+            <a:spLocks noGrp="1"/>
+          </p:cNvSpPr>
+          <p:nvPr>
+            <p:ph idx="1"/>
+          </p:nvPr>
+        </p:nvSpPr>
+        <p:spPr/>
+        <p:txBody>
+          <a:bodyPr/>
+          <a:lstStyle/>
+          <a:p>
+            <a:r>
+              <a:rPr lang="de-DE" dirty="0"/>
+              <a:t>Cluster </a:t>
+            </a:r>
+            <a:r>
+              <a:rPr lang="de-DE" dirty="0" smtClean="0"/>
+              <a:t>bilden</a:t>
+            </a:r>
+          </a:p>
+          <a:p>
+            <a:r>
+              <a:rPr lang="de-DE" dirty="0" smtClean="0"/>
+              <a:t>Konvergenz um </a:t>
+            </a:r>
+            <a:r>
+              <a:rPr lang="de-DE" dirty="0" err="1" smtClean="0"/>
+              <a:t>Tc</a:t>
+            </a:r>
+            <a:endParaRPr lang="de-DE" dirty="0"/>
+          </a:p>
+          <a:p>
+            <a:r>
+              <a:rPr lang="de-DE" dirty="0" smtClean="0"/>
+              <a:t>Wolff-Algorithmus</a:t>
+            </a:r>
+            <a:endParaRPr lang="de-DE" dirty="0"/>
+          </a:p>
+        </p:txBody>
+      </p:sp>
+      <p:sp>
+        <p:nvSpPr>
           <p:cNvPr id="4" name="Fußzeilenplatzhalter 3"/>
           <p:cNvSpPr>
             <a:spLocks noGrp="1"/>
@@ -4326,6 +4374,314 @@
             <a:fld id="{6C7B5FFE-6139-497F-B3B7-1760D39A0C40}" type="slidenum">
               <a:rPr lang="de-DE" smtClean="0"/>
               <a:t>13</a:t>
+            </a:fld>
+            <a:endParaRPr lang="de-DE"/>
+          </a:p>
+        </p:txBody>
+      </p:sp>
+      <p:sp>
+        <p:nvSpPr>
+          <p:cNvPr id="6" name="Titel 1"/>
+          <p:cNvSpPr txBox="1">
+            <a:spLocks/>
+          </p:cNvSpPr>
+          <p:nvPr/>
+        </p:nvSpPr>
+        <p:spPr>
+          <a:xfrm>
+            <a:off x="0" y="0"/>
+            <a:ext cx="9144000" cy="548680"/>
+          </a:xfrm>
+          <a:prstGeom prst="rect">
+            <a:avLst/>
+          </a:prstGeom>
+          <a:solidFill>
+            <a:schemeClr val="accent1">
+              <a:alpha val="82000"/>
+            </a:schemeClr>
+          </a:solidFill>
+        </p:spPr>
+        <p:txBody>
+          <a:bodyPr vert="horz" lIns="91440" tIns="45720" rIns="91440" bIns="45720" rtlCol="0" anchor="ctr">
+            <a:normAutofit fontScale="82500" lnSpcReduction="20000"/>
+          </a:bodyPr>
+          <a:lstStyle>
+            <a:lvl1pPr algn="ctr" defTabSz="914400" rtl="0" eaLnBrk="1" latinLnBrk="0" hangingPunct="1">
+              <a:spcBef>
+                <a:spcPct val="0"/>
+              </a:spcBef>
+              <a:buNone/>
+              <a:defRPr sz="4400" kern="1200">
+                <a:solidFill>
+                  <a:schemeClr val="tx1"/>
+                </a:solidFill>
+                <a:latin typeface="+mj-lt"/>
+                <a:ea typeface="+mj-ea"/>
+                <a:cs typeface="+mj-cs"/>
+              </a:defRPr>
+            </a:lvl1pPr>
+          </a:lstStyle>
+          <a:p>
+            <a:pPr algn="l"/>
+            <a:r>
+              <a:rPr lang="de-DE" dirty="0" smtClean="0"/>
+              <a:t>Cluster-Update-Verfahren</a:t>
+            </a:r>
+            <a:endParaRPr lang="de-DE" dirty="0"/>
+          </a:p>
+        </p:txBody>
+      </p:sp>
+    </p:spTree>
+    <p:extLst>
+      <p:ext uri="{BB962C8B-B14F-4D97-AF65-F5344CB8AC3E}">
+        <p14:creationId xmlns:p14="http://schemas.microsoft.com/office/powerpoint/2010/main" val="3904143364"/>
+      </p:ext>
+    </p:extLst>
+  </p:cSld>
+  <p:clrMapOvr>
+    <a:masterClrMapping/>
+  </p:clrMapOvr>
+  <p:timing>
+    <p:tnLst>
+      <p:par>
+        <p:cTn id="1" dur="indefinite" restart="never" nodeType="tmRoot">
+          <p:childTnLst>
+            <p:seq concurrent="1" nextAc="seek">
+              <p:cTn id="2" dur="indefinite" nodeType="mainSeq">
+                <p:childTnLst>
+                  <p:par>
+                    <p:cTn id="3" fill="hold">
+                      <p:stCondLst>
+                        <p:cond delay="indefinite"/>
+                      </p:stCondLst>
+                      <p:childTnLst>
+                        <p:par>
+                          <p:cTn id="4" fill="hold">
+                            <p:stCondLst>
+                              <p:cond delay="0"/>
+                            </p:stCondLst>
+                            <p:childTnLst>
+                              <p:par>
+                                <p:cTn id="5" presetID="1" presetClass="entr" presetSubtype="0" fill="hold" grpId="0" nodeType="clickEffect">
+                                  <p:stCondLst>
+                                    <p:cond delay="0"/>
+                                  </p:stCondLst>
+                                  <p:childTnLst>
+                                    <p:set>
+                                      <p:cBhvr>
+                                        <p:cTn id="6" dur="1" fill="hold">
+                                          <p:stCondLst>
+                                            <p:cond delay="0"/>
+                                          </p:stCondLst>
+                                        </p:cTn>
+                                        <p:tgtEl>
+                                          <p:spTgt spid="3">
+                                            <p:txEl>
+                                              <p:pRg st="0" end="0"/>
+                                            </p:txEl>
+                                          </p:spTgt>
+                                        </p:tgtEl>
+                                        <p:attrNameLst>
+                                          <p:attrName>style.visibility</p:attrName>
+                                        </p:attrNameLst>
+                                      </p:cBhvr>
+                                      <p:to>
+                                        <p:strVal val="visible"/>
+                                      </p:to>
+                                    </p:set>
+                                  </p:childTnLst>
+                                </p:cTn>
+                              </p:par>
+                            </p:childTnLst>
+                          </p:cTn>
+                        </p:par>
+                      </p:childTnLst>
+                    </p:cTn>
+                  </p:par>
+                  <p:par>
+                    <p:cTn id="7" fill="hold">
+                      <p:stCondLst>
+                        <p:cond delay="indefinite"/>
+                      </p:stCondLst>
+                      <p:childTnLst>
+                        <p:par>
+                          <p:cTn id="8" fill="hold">
+                            <p:stCondLst>
+                              <p:cond delay="0"/>
+                            </p:stCondLst>
+                            <p:childTnLst>
+                              <p:par>
+                                <p:cTn id="9" presetID="1" presetClass="entr" presetSubtype="0" fill="hold" grpId="0" nodeType="clickEffect">
+                                  <p:stCondLst>
+                                    <p:cond delay="0"/>
+                                  </p:stCondLst>
+                                  <p:childTnLst>
+                                    <p:set>
+                                      <p:cBhvr>
+                                        <p:cTn id="10" dur="1" fill="hold">
+                                          <p:stCondLst>
+                                            <p:cond delay="0"/>
+                                          </p:stCondLst>
+                                        </p:cTn>
+                                        <p:tgtEl>
+                                          <p:spTgt spid="3">
+                                            <p:txEl>
+                                              <p:pRg st="1" end="1"/>
+                                            </p:txEl>
+                                          </p:spTgt>
+                                        </p:tgtEl>
+                                        <p:attrNameLst>
+                                          <p:attrName>style.visibility</p:attrName>
+                                        </p:attrNameLst>
+                                      </p:cBhvr>
+                                      <p:to>
+                                        <p:strVal val="visible"/>
+                                      </p:to>
+                                    </p:set>
+                                  </p:childTnLst>
+                                </p:cTn>
+                              </p:par>
+                            </p:childTnLst>
+                          </p:cTn>
+                        </p:par>
+                      </p:childTnLst>
+                    </p:cTn>
+                  </p:par>
+                  <p:par>
+                    <p:cTn id="11" fill="hold">
+                      <p:stCondLst>
+                        <p:cond delay="indefinite"/>
+                      </p:stCondLst>
+                      <p:childTnLst>
+                        <p:par>
+                          <p:cTn id="12" fill="hold">
+                            <p:stCondLst>
+                              <p:cond delay="0"/>
+                            </p:stCondLst>
+                            <p:childTnLst>
+                              <p:par>
+                                <p:cTn id="13" presetID="1" presetClass="entr" presetSubtype="0" fill="hold" grpId="0" nodeType="clickEffect">
+                                  <p:stCondLst>
+                                    <p:cond delay="0"/>
+                                  </p:stCondLst>
+                                  <p:childTnLst>
+                                    <p:set>
+                                      <p:cBhvr>
+                                        <p:cTn id="14" dur="1" fill="hold">
+                                          <p:stCondLst>
+                                            <p:cond delay="0"/>
+                                          </p:stCondLst>
+                                        </p:cTn>
+                                        <p:tgtEl>
+                                          <p:spTgt spid="3">
+                                            <p:txEl>
+                                              <p:pRg st="2" end="2"/>
+                                            </p:txEl>
+                                          </p:spTgt>
+                                        </p:tgtEl>
+                                        <p:attrNameLst>
+                                          <p:attrName>style.visibility</p:attrName>
+                                        </p:attrNameLst>
+                                      </p:cBhvr>
+                                      <p:to>
+                                        <p:strVal val="visible"/>
+                                      </p:to>
+                                    </p:set>
+                                  </p:childTnLst>
+                                </p:cTn>
+                              </p:par>
+                            </p:childTnLst>
+                          </p:cTn>
+                        </p:par>
+                      </p:childTnLst>
+                    </p:cTn>
+                  </p:par>
+                </p:childTnLst>
+              </p:cTn>
+              <p:prevCondLst>
+                <p:cond evt="onPrev" delay="0">
+                  <p:tgtEl>
+                    <p:sldTgt/>
+                  </p:tgtEl>
+                </p:cond>
+              </p:prevCondLst>
+              <p:nextCondLst>
+                <p:cond evt="onNext" delay="0">
+                  <p:tgtEl>
+                    <p:sldTgt/>
+                  </p:tgtEl>
+                </p:cond>
+              </p:nextCondLst>
+            </p:seq>
+          </p:childTnLst>
+        </p:cTn>
+      </p:par>
+    </p:tnLst>
+    <p:bldLst>
+      <p:bldP spid="3" grpId="0" build="p"/>
+    </p:bldLst>
+  </p:timing>
+</p:sld>
+</file>
+
+<file path=ppt/slides/slide14.xml><?xml version="1.0" encoding="utf-8"?>
+<p:sld xmlns:a="http://schemas.openxmlformats.org/drawingml/2006/main" xmlns:r="http://schemas.openxmlformats.org/officeDocument/2006/relationships" xmlns:p="http://schemas.openxmlformats.org/presentationml/2006/main">
+  <p:cSld>
+    <p:spTree>
+      <p:nvGrpSpPr>
+        <p:cNvPr id="1" name=""/>
+        <p:cNvGrpSpPr/>
+        <p:nvPr/>
+      </p:nvGrpSpPr>
+      <p:grpSpPr>
+        <a:xfrm>
+          <a:off x="0" y="0"/>
+          <a:ext cx="0" cy="0"/>
+          <a:chOff x="0" y="0"/>
+          <a:chExt cx="0" cy="0"/>
+        </a:xfrm>
+      </p:grpSpPr>
+      <p:sp>
+        <p:nvSpPr>
+          <p:cNvPr id="4" name="Fußzeilenplatzhalter 3"/>
+          <p:cNvSpPr>
+            <a:spLocks noGrp="1"/>
+          </p:cNvSpPr>
+          <p:nvPr>
+            <p:ph type="ftr" sz="quarter" idx="11"/>
+          </p:nvPr>
+        </p:nvSpPr>
+        <p:spPr/>
+        <p:txBody>
+          <a:bodyPr/>
+          <a:lstStyle/>
+          <a:p>
+            <a:r>
+              <a:rPr lang="de-DE" smtClean="0"/>
+              <a:t>Niek Andresen Robert Hartmann Jan Fabian Schmid</a:t>
+            </a:r>
+            <a:endParaRPr lang="de-DE"/>
+          </a:p>
+        </p:txBody>
+      </p:sp>
+      <p:sp>
+        <p:nvSpPr>
+          <p:cNvPr id="5" name="Foliennummernplatzhalter 4"/>
+          <p:cNvSpPr>
+            <a:spLocks noGrp="1"/>
+          </p:cNvSpPr>
+          <p:nvPr>
+            <p:ph type="sldNum" sz="quarter" idx="12"/>
+          </p:nvPr>
+        </p:nvSpPr>
+        <p:spPr/>
+        <p:txBody>
+          <a:bodyPr/>
+          <a:lstStyle/>
+          <a:p>
+            <a:fld id="{6C7B5FFE-6139-497F-B3B7-1760D39A0C40}" type="slidenum">
+              <a:rPr lang="de-DE" smtClean="0"/>
+              <a:t>14</a:t>
             </a:fld>
             <a:endParaRPr lang="de-DE"/>
           </a:p>
@@ -4556,7 +4912,7 @@
             <a:pPr algn="l"/>
             <a:r>
               <a:rPr lang="de-DE" dirty="0" smtClean="0"/>
-              <a:t>Cluster Update</a:t>
+              <a:t>Wolff-Algorithmus</a:t>
             </a:r>
             <a:endParaRPr lang="de-DE" dirty="0"/>
           </a:p>
@@ -4575,232 +4931,300 @@
   <p:timing>
     <p:tnLst>
       <p:par>
-        <p:cTn id="1" dur="indefinite" restart="never" nodeType="tmRoot"/>
-      </p:par>
-    </p:tnLst>
-  </p:timing>
-</p:sld>
-</file>
-
-<file path=ppt/slides/slide14.xml><?xml version="1.0" encoding="utf-8"?>
-<p:sld xmlns:a="http://schemas.openxmlformats.org/drawingml/2006/main" xmlns:r="http://schemas.openxmlformats.org/officeDocument/2006/relationships" xmlns:p="http://schemas.openxmlformats.org/presentationml/2006/main">
-  <p:cSld>
-    <p:spTree>
-      <p:nvGrpSpPr>
-        <p:cNvPr id="1" name=""/>
-        <p:cNvGrpSpPr/>
-        <p:nvPr/>
-      </p:nvGrpSpPr>
-      <p:grpSpPr>
-        <a:xfrm>
-          <a:off x="0" y="0"/>
-          <a:ext cx="0" cy="0"/>
-          <a:chOff x="0" y="0"/>
-          <a:chExt cx="0" cy="0"/>
-        </a:xfrm>
-      </p:grpSpPr>
-      <p:sp>
-        <p:nvSpPr>
-          <p:cNvPr id="4" name="Fußzeilenplatzhalter 3"/>
-          <p:cNvSpPr>
-            <a:spLocks noGrp="1"/>
-          </p:cNvSpPr>
-          <p:nvPr>
-            <p:ph type="ftr" sz="quarter" idx="11"/>
-          </p:nvPr>
-        </p:nvSpPr>
-        <p:spPr/>
-        <p:txBody>
-          <a:bodyPr/>
-          <a:lstStyle/>
-          <a:p>
-            <a:r>
-              <a:rPr lang="de-DE" smtClean="0"/>
-              <a:t>Niek Andresen Robert Hartmann Jan Fabian Schmid</a:t>
-            </a:r>
-            <a:endParaRPr lang="de-DE"/>
-          </a:p>
-        </p:txBody>
-      </p:sp>
-      <p:sp>
-        <p:nvSpPr>
-          <p:cNvPr id="5" name="Foliennummernplatzhalter 4"/>
-          <p:cNvSpPr>
-            <a:spLocks noGrp="1"/>
-          </p:cNvSpPr>
-          <p:nvPr>
-            <p:ph type="sldNum" sz="quarter" idx="12"/>
-          </p:nvPr>
-        </p:nvSpPr>
-        <p:spPr/>
-        <p:txBody>
-          <a:bodyPr/>
-          <a:lstStyle/>
-          <a:p>
-            <a:fld id="{6C7B5FFE-6139-497F-B3B7-1760D39A0C40}" type="slidenum">
-              <a:rPr lang="de-DE" smtClean="0"/>
-              <a:t>14</a:t>
-            </a:fld>
-            <a:endParaRPr lang="de-DE"/>
-          </a:p>
-        </p:txBody>
-      </p:sp>
-      <p:pic>
-        <p:nvPicPr>
-          <p:cNvPr id="6" name="Inhaltsplatzhalter 6"/>
-          <p:cNvPicPr>
-            <a:picLocks noChangeAspect="1"/>
-          </p:cNvPicPr>
-          <p:nvPr/>
-        </p:nvPicPr>
-        <p:blipFill>
-          <a:blip r:embed="rId2" cstate="print">
-            <a:extLst>
-              <a:ext uri="{28A0092B-C50C-407E-A947-70E740481C1C}">
-                <a14:useLocalDpi xmlns:a14="http://schemas.microsoft.com/office/drawing/2010/main" val="0"/>
-              </a:ext>
-            </a:extLst>
-          </a:blip>
-          <a:stretch>
-            <a:fillRect/>
-          </a:stretch>
-        </p:blipFill>
-        <p:spPr>
-          <a:xfrm>
-            <a:off x="6573" y="2204863"/>
-            <a:ext cx="3053259" cy="2119865"/>
-          </a:xfrm>
-          <a:prstGeom prst="rect">
-            <a:avLst/>
-          </a:prstGeom>
-        </p:spPr>
-      </p:pic>
-      <p:pic>
-        <p:nvPicPr>
-          <p:cNvPr id="7" name="Inhaltsplatzhalter 6"/>
-          <p:cNvPicPr>
-            <a:picLocks noChangeAspect="1"/>
-          </p:cNvPicPr>
-          <p:nvPr/>
-        </p:nvPicPr>
-        <p:blipFill>
-          <a:blip r:embed="rId3" cstate="print">
-            <a:extLst>
-              <a:ext uri="{28A0092B-C50C-407E-A947-70E740481C1C}">
-                <a14:useLocalDpi xmlns:a14="http://schemas.microsoft.com/office/drawing/2010/main" val="0"/>
-              </a:ext>
-            </a:extLst>
-          </a:blip>
-          <a:stretch>
-            <a:fillRect/>
-          </a:stretch>
-        </p:blipFill>
-        <p:spPr>
-          <a:xfrm>
-            <a:off x="2915816" y="2204863"/>
-            <a:ext cx="3053260" cy="2119865"/>
-          </a:xfrm>
-          <a:prstGeom prst="rect">
-            <a:avLst/>
-          </a:prstGeom>
-        </p:spPr>
-      </p:pic>
-      <p:pic>
-        <p:nvPicPr>
-          <p:cNvPr id="8" name="Inhaltsplatzhalter 6"/>
-          <p:cNvPicPr>
-            <a:picLocks noChangeAspect="1"/>
-          </p:cNvPicPr>
-          <p:nvPr/>
-        </p:nvPicPr>
-        <p:blipFill>
-          <a:blip r:embed="rId4" cstate="print">
-            <a:extLst>
-              <a:ext uri="{28A0092B-C50C-407E-A947-70E740481C1C}">
-                <a14:useLocalDpi xmlns:a14="http://schemas.microsoft.com/office/drawing/2010/main" val="0"/>
-              </a:ext>
-            </a:extLst>
-          </a:blip>
-          <a:stretch>
-            <a:fillRect/>
-          </a:stretch>
-        </p:blipFill>
-        <p:spPr>
-          <a:xfrm>
-            <a:off x="5839221" y="2204863"/>
-            <a:ext cx="3053259" cy="2119865"/>
-          </a:xfrm>
-          <a:prstGeom prst="rect">
-            <a:avLst/>
-          </a:prstGeom>
-        </p:spPr>
-      </p:pic>
-      <p:sp>
-        <p:nvSpPr>
-          <p:cNvPr id="9" name="Titel 1"/>
-          <p:cNvSpPr txBox="1">
-            <a:spLocks/>
-          </p:cNvSpPr>
-          <p:nvPr/>
-        </p:nvSpPr>
-        <p:spPr>
-          <a:xfrm>
-            <a:off x="0" y="0"/>
-            <a:ext cx="9144000" cy="548680"/>
-          </a:xfrm>
-          <a:prstGeom prst="rect">
-            <a:avLst/>
-          </a:prstGeom>
-          <a:solidFill>
-            <a:schemeClr val="accent1">
-              <a:alpha val="82000"/>
-            </a:schemeClr>
-          </a:solidFill>
-        </p:spPr>
-        <p:txBody>
-          <a:bodyPr vert="horz" lIns="91440" tIns="45720" rIns="91440" bIns="45720" rtlCol="0" anchor="ctr">
-            <a:normAutofit fontScale="82500" lnSpcReduction="20000"/>
-          </a:bodyPr>
-          <a:lstStyle>
-            <a:lvl1pPr algn="ctr" defTabSz="914400" rtl="0" eaLnBrk="1" latinLnBrk="0" hangingPunct="1">
-              <a:spcBef>
-                <a:spcPct val="0"/>
-              </a:spcBef>
-              <a:buNone/>
-              <a:defRPr sz="4400" kern="1200">
-                <a:solidFill>
-                  <a:schemeClr val="tx1"/>
-                </a:solidFill>
-                <a:latin typeface="+mj-lt"/>
-                <a:ea typeface="+mj-ea"/>
-                <a:cs typeface="+mj-cs"/>
-              </a:defRPr>
-            </a:lvl1pPr>
-          </a:lstStyle>
-          <a:p>
-            <a:pPr algn="l"/>
-            <a:r>
-              <a:rPr lang="de-DE" dirty="0" smtClean="0"/>
-              <a:t>Vergleich Cluster Update - Metropolis</a:t>
-            </a:r>
-            <a:endParaRPr lang="de-DE" dirty="0"/>
-          </a:p>
-        </p:txBody>
-      </p:sp>
-    </p:spTree>
-    <p:extLst>
-      <p:ext uri="{BB962C8B-B14F-4D97-AF65-F5344CB8AC3E}">
-        <p14:creationId xmlns:p14="http://schemas.microsoft.com/office/powerpoint/2010/main" val="1722252954"/>
-      </p:ext>
-    </p:extLst>
-  </p:cSld>
-  <p:clrMapOvr>
-    <a:masterClrMapping/>
-  </p:clrMapOvr>
-  <p:timing>
-    <p:tnLst>
-      <p:par>
-        <p:cTn id="1" dur="indefinite" restart="never" nodeType="tmRoot"/>
+        <p:cTn id="1" dur="indefinite" restart="never" nodeType="tmRoot">
+          <p:childTnLst>
+            <p:seq concurrent="1" nextAc="seek">
+              <p:cTn id="2" dur="indefinite" nodeType="mainSeq">
+                <p:childTnLst>
+                  <p:par>
+                    <p:cTn id="3" fill="hold">
+                      <p:stCondLst>
+                        <p:cond delay="indefinite"/>
+                      </p:stCondLst>
+                      <p:childTnLst>
+                        <p:par>
+                          <p:cTn id="4" fill="hold">
+                            <p:stCondLst>
+                              <p:cond delay="0"/>
+                            </p:stCondLst>
+                            <p:childTnLst>
+                              <p:par>
+                                <p:cTn id="5" presetID="1" presetClass="entr" presetSubtype="0" fill="hold" nodeType="clickEffect">
+                                  <p:stCondLst>
+                                    <p:cond delay="0"/>
+                                  </p:stCondLst>
+                                  <p:childTnLst>
+                                    <p:set>
+                                      <p:cBhvr>
+                                        <p:cTn id="6" dur="1" fill="hold">
+                                          <p:stCondLst>
+                                            <p:cond delay="0"/>
+                                          </p:stCondLst>
+                                        </p:cTn>
+                                        <p:tgtEl>
+                                          <p:spTgt spid="7"/>
+                                        </p:tgtEl>
+                                        <p:attrNameLst>
+                                          <p:attrName>style.visibility</p:attrName>
+                                        </p:attrNameLst>
+                                      </p:cBhvr>
+                                      <p:to>
+                                        <p:strVal val="visible"/>
+                                      </p:to>
+                                    </p:set>
+                                  </p:childTnLst>
+                                </p:cTn>
+                              </p:par>
+                            </p:childTnLst>
+                          </p:cTn>
+                        </p:par>
+                      </p:childTnLst>
+                    </p:cTn>
+                  </p:par>
+                  <p:par>
+                    <p:cTn id="7" fill="hold">
+                      <p:stCondLst>
+                        <p:cond delay="indefinite"/>
+                      </p:stCondLst>
+                      <p:childTnLst>
+                        <p:par>
+                          <p:cTn id="8" fill="hold">
+                            <p:stCondLst>
+                              <p:cond delay="0"/>
+                            </p:stCondLst>
+                            <p:childTnLst>
+                              <p:par>
+                                <p:cTn id="9" presetID="1" presetClass="entr" presetSubtype="0" fill="hold" nodeType="clickEffect">
+                                  <p:stCondLst>
+                                    <p:cond delay="0"/>
+                                  </p:stCondLst>
+                                  <p:childTnLst>
+                                    <p:set>
+                                      <p:cBhvr>
+                                        <p:cTn id="10" dur="1" fill="hold">
+                                          <p:stCondLst>
+                                            <p:cond delay="0"/>
+                                          </p:stCondLst>
+                                        </p:cTn>
+                                        <p:tgtEl>
+                                          <p:spTgt spid="9"/>
+                                        </p:tgtEl>
+                                        <p:attrNameLst>
+                                          <p:attrName>style.visibility</p:attrName>
+                                        </p:attrNameLst>
+                                      </p:cBhvr>
+                                      <p:to>
+                                        <p:strVal val="visible"/>
+                                      </p:to>
+                                    </p:set>
+                                  </p:childTnLst>
+                                </p:cTn>
+                              </p:par>
+                            </p:childTnLst>
+                          </p:cTn>
+                        </p:par>
+                      </p:childTnLst>
+                    </p:cTn>
+                  </p:par>
+                  <p:par>
+                    <p:cTn id="11" fill="hold">
+                      <p:stCondLst>
+                        <p:cond delay="indefinite"/>
+                      </p:stCondLst>
+                      <p:childTnLst>
+                        <p:par>
+                          <p:cTn id="12" fill="hold">
+                            <p:stCondLst>
+                              <p:cond delay="0"/>
+                            </p:stCondLst>
+                            <p:childTnLst>
+                              <p:par>
+                                <p:cTn id="13" presetID="1" presetClass="entr" presetSubtype="0" fill="hold" nodeType="clickEffect">
+                                  <p:stCondLst>
+                                    <p:cond delay="0"/>
+                                  </p:stCondLst>
+                                  <p:childTnLst>
+                                    <p:set>
+                                      <p:cBhvr>
+                                        <p:cTn id="14" dur="1" fill="hold">
+                                          <p:stCondLst>
+                                            <p:cond delay="0"/>
+                                          </p:stCondLst>
+                                        </p:cTn>
+                                        <p:tgtEl>
+                                          <p:spTgt spid="11"/>
+                                        </p:tgtEl>
+                                        <p:attrNameLst>
+                                          <p:attrName>style.visibility</p:attrName>
+                                        </p:attrNameLst>
+                                      </p:cBhvr>
+                                      <p:to>
+                                        <p:strVal val="visible"/>
+                                      </p:to>
+                                    </p:set>
+                                  </p:childTnLst>
+                                </p:cTn>
+                              </p:par>
+                            </p:childTnLst>
+                          </p:cTn>
+                        </p:par>
+                      </p:childTnLst>
+                    </p:cTn>
+                  </p:par>
+                  <p:par>
+                    <p:cTn id="15" fill="hold">
+                      <p:stCondLst>
+                        <p:cond delay="indefinite"/>
+                      </p:stCondLst>
+                      <p:childTnLst>
+                        <p:par>
+                          <p:cTn id="16" fill="hold">
+                            <p:stCondLst>
+                              <p:cond delay="0"/>
+                            </p:stCondLst>
+                            <p:childTnLst>
+                              <p:par>
+                                <p:cTn id="17" presetID="1" presetClass="entr" presetSubtype="0" fill="hold" nodeType="clickEffect">
+                                  <p:stCondLst>
+                                    <p:cond delay="0"/>
+                                  </p:stCondLst>
+                                  <p:childTnLst>
+                                    <p:set>
+                                      <p:cBhvr>
+                                        <p:cTn id="18" dur="1" fill="hold">
+                                          <p:stCondLst>
+                                            <p:cond delay="0"/>
+                                          </p:stCondLst>
+                                        </p:cTn>
+                                        <p:tgtEl>
+                                          <p:spTgt spid="8"/>
+                                        </p:tgtEl>
+                                        <p:attrNameLst>
+                                          <p:attrName>style.visibility</p:attrName>
+                                        </p:attrNameLst>
+                                      </p:cBhvr>
+                                      <p:to>
+                                        <p:strVal val="visible"/>
+                                      </p:to>
+                                    </p:set>
+                                  </p:childTnLst>
+                                </p:cTn>
+                              </p:par>
+                            </p:childTnLst>
+                          </p:cTn>
+                        </p:par>
+                      </p:childTnLst>
+                    </p:cTn>
+                  </p:par>
+                  <p:par>
+                    <p:cTn id="19" fill="hold">
+                      <p:stCondLst>
+                        <p:cond delay="indefinite"/>
+                      </p:stCondLst>
+                      <p:childTnLst>
+                        <p:par>
+                          <p:cTn id="20" fill="hold">
+                            <p:stCondLst>
+                              <p:cond delay="0"/>
+                            </p:stCondLst>
+                            <p:childTnLst>
+                              <p:par>
+                                <p:cTn id="21" presetID="1" presetClass="entr" presetSubtype="0" fill="hold" nodeType="clickEffect">
+                                  <p:stCondLst>
+                                    <p:cond delay="0"/>
+                                  </p:stCondLst>
+                                  <p:childTnLst>
+                                    <p:set>
+                                      <p:cBhvr>
+                                        <p:cTn id="22" dur="1" fill="hold">
+                                          <p:stCondLst>
+                                            <p:cond delay="0"/>
+                                          </p:stCondLst>
+                                        </p:cTn>
+                                        <p:tgtEl>
+                                          <p:spTgt spid="10"/>
+                                        </p:tgtEl>
+                                        <p:attrNameLst>
+                                          <p:attrName>style.visibility</p:attrName>
+                                        </p:attrNameLst>
+                                      </p:cBhvr>
+                                      <p:to>
+                                        <p:strVal val="visible"/>
+                                      </p:to>
+                                    </p:set>
+                                  </p:childTnLst>
+                                </p:cTn>
+                              </p:par>
+                            </p:childTnLst>
+                          </p:cTn>
+                        </p:par>
+                      </p:childTnLst>
+                    </p:cTn>
+                  </p:par>
+                  <p:par>
+                    <p:cTn id="23" fill="hold">
+                      <p:stCondLst>
+                        <p:cond delay="indefinite"/>
+                      </p:stCondLst>
+                      <p:childTnLst>
+                        <p:par>
+                          <p:cTn id="24" fill="hold">
+                            <p:stCondLst>
+                              <p:cond delay="0"/>
+                            </p:stCondLst>
+                            <p:childTnLst>
+                              <p:par>
+                                <p:cTn id="25" presetID="1" presetClass="entr" presetSubtype="0" fill="hold" nodeType="clickEffect">
+                                  <p:stCondLst>
+                                    <p:cond delay="0"/>
+                                  </p:stCondLst>
+                                  <p:childTnLst>
+                                    <p:set>
+                                      <p:cBhvr>
+                                        <p:cTn id="26" dur="1" fill="hold">
+                                          <p:stCondLst>
+                                            <p:cond delay="0"/>
+                                          </p:stCondLst>
+                                        </p:cTn>
+                                        <p:tgtEl>
+                                          <p:spTgt spid="12"/>
+                                        </p:tgtEl>
+                                        <p:attrNameLst>
+                                          <p:attrName>style.visibility</p:attrName>
+                                        </p:attrNameLst>
+                                      </p:cBhvr>
+                                      <p:to>
+                                        <p:strVal val="visible"/>
+                                      </p:to>
+                                    </p:set>
+                                  </p:childTnLst>
+                                </p:cTn>
+                              </p:par>
+                            </p:childTnLst>
+                          </p:cTn>
+                        </p:par>
+                      </p:childTnLst>
+                    </p:cTn>
+                  </p:par>
+                </p:childTnLst>
+              </p:cTn>
+              <p:prevCondLst>
+                <p:cond evt="onPrev" delay="0">
+                  <p:tgtEl>
+                    <p:sldTgt/>
+                  </p:tgtEl>
+                </p:cond>
+              </p:prevCondLst>
+              <p:nextCondLst>
+                <p:cond evt="onNext" delay="0">
+                  <p:tgtEl>
+                    <p:sldTgt/>
+                  </p:tgtEl>
+                </p:cond>
+              </p:nextCondLst>
+            </p:seq>
+          </p:childTnLst>
+        </p:cTn>
       </p:par>
     </p:tnLst>
   </p:timing>
@@ -4865,6 +5289,544 @@
             <a:fld id="{6C7B5FFE-6139-497F-B3B7-1760D39A0C40}" type="slidenum">
               <a:rPr lang="de-DE" smtClean="0"/>
               <a:t>15</a:t>
+            </a:fld>
+            <a:endParaRPr lang="de-DE"/>
+          </a:p>
+        </p:txBody>
+      </p:sp>
+      <p:pic>
+        <p:nvPicPr>
+          <p:cNvPr id="6" name="Inhaltsplatzhalter 6"/>
+          <p:cNvPicPr>
+            <a:picLocks noChangeAspect="1"/>
+          </p:cNvPicPr>
+          <p:nvPr/>
+        </p:nvPicPr>
+        <p:blipFill>
+          <a:blip r:embed="rId2" cstate="print">
+            <a:extLst>
+              <a:ext uri="{28A0092B-C50C-407E-A947-70E740481C1C}">
+                <a14:useLocalDpi xmlns:a14="http://schemas.microsoft.com/office/drawing/2010/main" val="0"/>
+              </a:ext>
+            </a:extLst>
+          </a:blip>
+          <a:stretch>
+            <a:fillRect/>
+          </a:stretch>
+        </p:blipFill>
+        <p:spPr>
+          <a:xfrm>
+            <a:off x="-247602" y="1893672"/>
+            <a:ext cx="4806636" cy="3337228"/>
+          </a:xfrm>
+          <a:prstGeom prst="rect">
+            <a:avLst/>
+          </a:prstGeom>
+        </p:spPr>
+      </p:pic>
+      <p:sp>
+        <p:nvSpPr>
+          <p:cNvPr id="9" name="Titel 1"/>
+          <p:cNvSpPr txBox="1">
+            <a:spLocks/>
+          </p:cNvSpPr>
+          <p:nvPr/>
+        </p:nvSpPr>
+        <p:spPr>
+          <a:xfrm>
+            <a:off x="0" y="0"/>
+            <a:ext cx="9144000" cy="548680"/>
+          </a:xfrm>
+          <a:prstGeom prst="rect">
+            <a:avLst/>
+          </a:prstGeom>
+          <a:solidFill>
+            <a:schemeClr val="accent1">
+              <a:alpha val="82000"/>
+            </a:schemeClr>
+          </a:solidFill>
+        </p:spPr>
+        <p:txBody>
+          <a:bodyPr vert="horz" lIns="91440" tIns="45720" rIns="91440" bIns="45720" rtlCol="0" anchor="ctr">
+            <a:normAutofit fontScale="82500" lnSpcReduction="20000"/>
+          </a:bodyPr>
+          <a:lstStyle>
+            <a:lvl1pPr algn="ctr" defTabSz="914400" rtl="0" eaLnBrk="1" latinLnBrk="0" hangingPunct="1">
+              <a:spcBef>
+                <a:spcPct val="0"/>
+              </a:spcBef>
+              <a:buNone/>
+              <a:defRPr sz="4400" kern="1200">
+                <a:solidFill>
+                  <a:schemeClr val="tx1"/>
+                </a:solidFill>
+                <a:latin typeface="+mj-lt"/>
+                <a:ea typeface="+mj-ea"/>
+                <a:cs typeface="+mj-cs"/>
+              </a:defRPr>
+            </a:lvl1pPr>
+          </a:lstStyle>
+          <a:p>
+            <a:pPr algn="l"/>
+            <a:r>
+              <a:rPr lang="de-DE" dirty="0" err="1" smtClean="0"/>
+              <a:t>Absolutbetrag</a:t>
+            </a:r>
+            <a:r>
+              <a:rPr lang="de-DE" dirty="0" smtClean="0"/>
+              <a:t> bei Cluster Auswertung</a:t>
+            </a:r>
+            <a:endParaRPr lang="de-DE" dirty="0"/>
+          </a:p>
+        </p:txBody>
+      </p:sp>
+      <p:sp>
+        <p:nvSpPr>
+          <p:cNvPr id="2" name="Textfeld 1"/>
+          <p:cNvSpPr txBox="1"/>
+          <p:nvPr/>
+        </p:nvSpPr>
+        <p:spPr>
+          <a:xfrm>
+            <a:off x="1107545" y="5230900"/>
+            <a:ext cx="2096343" cy="369332"/>
+          </a:xfrm>
+          <a:prstGeom prst="rect">
+            <a:avLst/>
+          </a:prstGeom>
+          <a:noFill/>
+        </p:spPr>
+        <p:txBody>
+          <a:bodyPr wrap="none" rtlCol="0">
+            <a:spAutoFit/>
+          </a:bodyPr>
+          <a:lstStyle/>
+          <a:p>
+            <a:r>
+              <a:rPr lang="de-DE" dirty="0" smtClean="0"/>
+              <a:t>Ohne </a:t>
+            </a:r>
+            <a:r>
+              <a:rPr lang="de-DE" dirty="0" err="1" smtClean="0"/>
+              <a:t>Absolutbetrag</a:t>
+            </a:r>
+            <a:endParaRPr lang="de-DE" dirty="0"/>
+          </a:p>
+        </p:txBody>
+      </p:sp>
+      <p:pic>
+        <p:nvPicPr>
+          <p:cNvPr id="10" name="Inhaltsplatzhalter 6"/>
+          <p:cNvPicPr>
+            <a:picLocks noChangeAspect="1"/>
+          </p:cNvPicPr>
+          <p:nvPr/>
+        </p:nvPicPr>
+        <p:blipFill>
+          <a:blip r:embed="rId3" cstate="print">
+            <a:extLst>
+              <a:ext uri="{28A0092B-C50C-407E-A947-70E740481C1C}">
+                <a14:useLocalDpi xmlns:a14="http://schemas.microsoft.com/office/drawing/2010/main" val="0"/>
+              </a:ext>
+            </a:extLst>
+          </a:blip>
+          <a:stretch>
+            <a:fillRect/>
+          </a:stretch>
+        </p:blipFill>
+        <p:spPr>
+          <a:xfrm>
+            <a:off x="4355975" y="1893672"/>
+            <a:ext cx="4806638" cy="3337228"/>
+          </a:xfrm>
+          <a:prstGeom prst="rect">
+            <a:avLst/>
+          </a:prstGeom>
+        </p:spPr>
+      </p:pic>
+      <p:sp>
+        <p:nvSpPr>
+          <p:cNvPr id="11" name="Textfeld 10"/>
+          <p:cNvSpPr txBox="1"/>
+          <p:nvPr/>
+        </p:nvSpPr>
+        <p:spPr>
+          <a:xfrm>
+            <a:off x="5820928" y="5204557"/>
+            <a:ext cx="1876732" cy="369332"/>
+          </a:xfrm>
+          <a:prstGeom prst="rect">
+            <a:avLst/>
+          </a:prstGeom>
+          <a:noFill/>
+        </p:spPr>
+        <p:txBody>
+          <a:bodyPr wrap="none" rtlCol="0">
+            <a:spAutoFit/>
+          </a:bodyPr>
+          <a:lstStyle/>
+          <a:p>
+            <a:r>
+              <a:rPr lang="de-DE" dirty="0" smtClean="0"/>
+              <a:t>Mit </a:t>
+            </a:r>
+            <a:r>
+              <a:rPr lang="de-DE" dirty="0" err="1" smtClean="0"/>
+              <a:t>Absolutbetrag</a:t>
+            </a:r>
+            <a:endParaRPr lang="de-DE" dirty="0"/>
+          </a:p>
+        </p:txBody>
+      </p:sp>
+    </p:spTree>
+    <p:extLst>
+      <p:ext uri="{BB962C8B-B14F-4D97-AF65-F5344CB8AC3E}">
+        <p14:creationId xmlns:p14="http://schemas.microsoft.com/office/powerpoint/2010/main" val="1722252954"/>
+      </p:ext>
+    </p:extLst>
+  </p:cSld>
+  <p:clrMapOvr>
+    <a:masterClrMapping/>
+  </p:clrMapOvr>
+  <p:timing>
+    <p:tnLst>
+      <p:par>
+        <p:cTn id="1" dur="indefinite" restart="never" nodeType="tmRoot"/>
+      </p:par>
+    </p:tnLst>
+  </p:timing>
+</p:sld>
+</file>
+
+<file path=ppt/slides/slide16.xml><?xml version="1.0" encoding="utf-8"?>
+<p:sld xmlns:a="http://schemas.openxmlformats.org/drawingml/2006/main" xmlns:r="http://schemas.openxmlformats.org/officeDocument/2006/relationships" xmlns:p="http://schemas.openxmlformats.org/presentationml/2006/main">
+  <p:cSld>
+    <p:spTree>
+      <p:nvGrpSpPr>
+        <p:cNvPr id="1" name=""/>
+        <p:cNvGrpSpPr/>
+        <p:nvPr/>
+      </p:nvGrpSpPr>
+      <p:grpSpPr>
+        <a:xfrm>
+          <a:off x="0" y="0"/>
+          <a:ext cx="0" cy="0"/>
+          <a:chOff x="0" y="0"/>
+          <a:chExt cx="0" cy="0"/>
+        </a:xfrm>
+      </p:grpSpPr>
+      <p:sp>
+        <p:nvSpPr>
+          <p:cNvPr id="4" name="Fußzeilenplatzhalter 3"/>
+          <p:cNvSpPr>
+            <a:spLocks noGrp="1"/>
+          </p:cNvSpPr>
+          <p:nvPr>
+            <p:ph type="ftr" sz="quarter" idx="11"/>
+          </p:nvPr>
+        </p:nvSpPr>
+        <p:spPr/>
+        <p:txBody>
+          <a:bodyPr/>
+          <a:lstStyle/>
+          <a:p>
+            <a:r>
+              <a:rPr lang="de-DE" smtClean="0"/>
+              <a:t>Niek Andresen Robert Hartmann Jan Fabian Schmid</a:t>
+            </a:r>
+            <a:endParaRPr lang="de-DE"/>
+          </a:p>
+        </p:txBody>
+      </p:sp>
+      <p:sp>
+        <p:nvSpPr>
+          <p:cNvPr id="5" name="Foliennummernplatzhalter 4"/>
+          <p:cNvSpPr>
+            <a:spLocks noGrp="1"/>
+          </p:cNvSpPr>
+          <p:nvPr>
+            <p:ph type="sldNum" sz="quarter" idx="12"/>
+          </p:nvPr>
+        </p:nvSpPr>
+        <p:spPr/>
+        <p:txBody>
+          <a:bodyPr/>
+          <a:lstStyle/>
+          <a:p>
+            <a:fld id="{6C7B5FFE-6139-497F-B3B7-1760D39A0C40}" type="slidenum">
+              <a:rPr lang="de-DE" smtClean="0"/>
+              <a:t>16</a:t>
+            </a:fld>
+            <a:endParaRPr lang="de-DE"/>
+          </a:p>
+        </p:txBody>
+      </p:sp>
+      <p:pic>
+        <p:nvPicPr>
+          <p:cNvPr id="7" name="Inhaltsplatzhalter 6"/>
+          <p:cNvPicPr>
+            <a:picLocks noChangeAspect="1"/>
+          </p:cNvPicPr>
+          <p:nvPr/>
+        </p:nvPicPr>
+        <p:blipFill>
+          <a:blip r:embed="rId2" cstate="print">
+            <a:extLst>
+              <a:ext uri="{28A0092B-C50C-407E-A947-70E740481C1C}">
+                <a14:useLocalDpi xmlns:a14="http://schemas.microsoft.com/office/drawing/2010/main" val="0"/>
+              </a:ext>
+            </a:extLst>
+          </a:blip>
+          <a:stretch>
+            <a:fillRect/>
+          </a:stretch>
+        </p:blipFill>
+        <p:spPr>
+          <a:xfrm>
+            <a:off x="-27353" y="1916832"/>
+            <a:ext cx="4599353" cy="3193311"/>
+          </a:xfrm>
+          <a:prstGeom prst="rect">
+            <a:avLst/>
+          </a:prstGeom>
+        </p:spPr>
+      </p:pic>
+      <p:pic>
+        <p:nvPicPr>
+          <p:cNvPr id="8" name="Inhaltsplatzhalter 6"/>
+          <p:cNvPicPr>
+            <a:picLocks noChangeAspect="1"/>
+          </p:cNvPicPr>
+          <p:nvPr/>
+        </p:nvPicPr>
+        <p:blipFill>
+          <a:blip r:embed="rId3" cstate="print">
+            <a:extLst>
+              <a:ext uri="{28A0092B-C50C-407E-A947-70E740481C1C}">
+                <a14:useLocalDpi xmlns:a14="http://schemas.microsoft.com/office/drawing/2010/main" val="0"/>
+              </a:ext>
+            </a:extLst>
+          </a:blip>
+          <a:stretch>
+            <a:fillRect/>
+          </a:stretch>
+        </p:blipFill>
+        <p:spPr>
+          <a:xfrm>
+            <a:off x="4355976" y="1916832"/>
+            <a:ext cx="4599352" cy="3193311"/>
+          </a:xfrm>
+          <a:prstGeom prst="rect">
+            <a:avLst/>
+          </a:prstGeom>
+        </p:spPr>
+      </p:pic>
+      <p:sp>
+        <p:nvSpPr>
+          <p:cNvPr id="9" name="Titel 1"/>
+          <p:cNvSpPr txBox="1">
+            <a:spLocks/>
+          </p:cNvSpPr>
+          <p:nvPr/>
+        </p:nvSpPr>
+        <p:spPr>
+          <a:xfrm>
+            <a:off x="0" y="0"/>
+            <a:ext cx="9144000" cy="548680"/>
+          </a:xfrm>
+          <a:prstGeom prst="rect">
+            <a:avLst/>
+          </a:prstGeom>
+          <a:solidFill>
+            <a:schemeClr val="accent1">
+              <a:alpha val="82000"/>
+            </a:schemeClr>
+          </a:solidFill>
+        </p:spPr>
+        <p:txBody>
+          <a:bodyPr vert="horz" lIns="91440" tIns="45720" rIns="91440" bIns="45720" rtlCol="0" anchor="ctr">
+            <a:normAutofit fontScale="82500" lnSpcReduction="20000"/>
+          </a:bodyPr>
+          <a:lstStyle>
+            <a:lvl1pPr algn="ctr" defTabSz="914400" rtl="0" eaLnBrk="1" latinLnBrk="0" hangingPunct="1">
+              <a:spcBef>
+                <a:spcPct val="0"/>
+              </a:spcBef>
+              <a:buNone/>
+              <a:defRPr sz="4400" kern="1200">
+                <a:solidFill>
+                  <a:schemeClr val="tx1"/>
+                </a:solidFill>
+                <a:latin typeface="+mj-lt"/>
+                <a:ea typeface="+mj-ea"/>
+                <a:cs typeface="+mj-cs"/>
+              </a:defRPr>
+            </a:lvl1pPr>
+          </a:lstStyle>
+          <a:p>
+            <a:pPr algn="l"/>
+            <a:r>
+              <a:rPr lang="de-DE" dirty="0" smtClean="0"/>
+              <a:t>Vergleich </a:t>
+            </a:r>
+            <a:r>
+              <a:rPr lang="de-DE" dirty="0" smtClean="0"/>
+              <a:t>Cluster-Update </a:t>
+            </a:r>
+            <a:r>
+              <a:rPr lang="de-DE" dirty="0" smtClean="0"/>
+              <a:t>und</a:t>
+            </a:r>
+            <a:r>
+              <a:rPr lang="de-DE" dirty="0" smtClean="0"/>
+              <a:t> </a:t>
+            </a:r>
+            <a:r>
+              <a:rPr lang="de-DE" dirty="0" smtClean="0"/>
+              <a:t>Metropolis</a:t>
+            </a:r>
+            <a:endParaRPr lang="de-DE" dirty="0"/>
+          </a:p>
+        </p:txBody>
+      </p:sp>
+      <p:sp>
+        <p:nvSpPr>
+          <p:cNvPr id="2" name="Textfeld 1"/>
+          <p:cNvSpPr txBox="1"/>
+          <p:nvPr/>
+        </p:nvSpPr>
+        <p:spPr>
+          <a:xfrm>
+            <a:off x="1472296" y="4960886"/>
+            <a:ext cx="1600053" cy="369332"/>
+          </a:xfrm>
+          <a:prstGeom prst="rect">
+            <a:avLst/>
+          </a:prstGeom>
+          <a:noFill/>
+        </p:spPr>
+        <p:txBody>
+          <a:bodyPr wrap="none" rtlCol="0">
+            <a:spAutoFit/>
+          </a:bodyPr>
+          <a:lstStyle/>
+          <a:p>
+            <a:r>
+              <a:rPr lang="de-DE" dirty="0" smtClean="0"/>
+              <a:t>Cluster-Update</a:t>
+            </a:r>
+            <a:endParaRPr lang="de-DE" dirty="0"/>
+          </a:p>
+        </p:txBody>
+      </p:sp>
+      <p:sp>
+        <p:nvSpPr>
+          <p:cNvPr id="10" name="Textfeld 9"/>
+          <p:cNvSpPr txBox="1"/>
+          <p:nvPr/>
+        </p:nvSpPr>
+        <p:spPr>
+          <a:xfrm>
+            <a:off x="6050422" y="5075892"/>
+            <a:ext cx="1210460" cy="369332"/>
+          </a:xfrm>
+          <a:prstGeom prst="rect">
+            <a:avLst/>
+          </a:prstGeom>
+          <a:noFill/>
+        </p:spPr>
+        <p:txBody>
+          <a:bodyPr wrap="none" rtlCol="0">
+            <a:spAutoFit/>
+          </a:bodyPr>
+          <a:lstStyle/>
+          <a:p>
+            <a:r>
+              <a:rPr lang="de-DE" dirty="0" smtClean="0"/>
+              <a:t>Metropolis</a:t>
+            </a:r>
+            <a:endParaRPr lang="de-DE" dirty="0"/>
+          </a:p>
+        </p:txBody>
+      </p:sp>
+    </p:spTree>
+    <p:extLst>
+      <p:ext uri="{BB962C8B-B14F-4D97-AF65-F5344CB8AC3E}">
+        <p14:creationId xmlns:p14="http://schemas.microsoft.com/office/powerpoint/2010/main" val="3737338863"/>
+      </p:ext>
+    </p:extLst>
+  </p:cSld>
+  <p:clrMapOvr>
+    <a:masterClrMapping/>
+  </p:clrMapOvr>
+  <p:timing>
+    <p:tnLst>
+      <p:par>
+        <p:cTn id="1" dur="indefinite" restart="never" nodeType="tmRoot"/>
+      </p:par>
+    </p:tnLst>
+  </p:timing>
+</p:sld>
+</file>
+
+<file path=ppt/slides/slide17.xml><?xml version="1.0" encoding="utf-8"?>
+<p:sld xmlns:a="http://schemas.openxmlformats.org/drawingml/2006/main" xmlns:r="http://schemas.openxmlformats.org/officeDocument/2006/relationships" xmlns:p="http://schemas.openxmlformats.org/presentationml/2006/main">
+  <p:cSld>
+    <p:spTree>
+      <p:nvGrpSpPr>
+        <p:cNvPr id="1" name=""/>
+        <p:cNvGrpSpPr/>
+        <p:nvPr/>
+      </p:nvGrpSpPr>
+      <p:grpSpPr>
+        <a:xfrm>
+          <a:off x="0" y="0"/>
+          <a:ext cx="0" cy="0"/>
+          <a:chOff x="0" y="0"/>
+          <a:chExt cx="0" cy="0"/>
+        </a:xfrm>
+      </p:grpSpPr>
+      <p:sp>
+        <p:nvSpPr>
+          <p:cNvPr id="4" name="Fußzeilenplatzhalter 3"/>
+          <p:cNvSpPr>
+            <a:spLocks noGrp="1"/>
+          </p:cNvSpPr>
+          <p:nvPr>
+            <p:ph type="ftr" sz="quarter" idx="11"/>
+          </p:nvPr>
+        </p:nvSpPr>
+        <p:spPr/>
+        <p:txBody>
+          <a:bodyPr/>
+          <a:lstStyle/>
+          <a:p>
+            <a:r>
+              <a:rPr lang="de-DE" smtClean="0"/>
+              <a:t>Niek Andresen Robert Hartmann Jan Fabian Schmid</a:t>
+            </a:r>
+            <a:endParaRPr lang="de-DE"/>
+          </a:p>
+        </p:txBody>
+      </p:sp>
+      <p:sp>
+        <p:nvSpPr>
+          <p:cNvPr id="5" name="Foliennummernplatzhalter 4"/>
+          <p:cNvSpPr>
+            <a:spLocks noGrp="1"/>
+          </p:cNvSpPr>
+          <p:nvPr>
+            <p:ph type="sldNum" sz="quarter" idx="12"/>
+          </p:nvPr>
+        </p:nvSpPr>
+        <p:spPr/>
+        <p:txBody>
+          <a:bodyPr/>
+          <a:lstStyle/>
+          <a:p>
+            <a:fld id="{6C7B5FFE-6139-497F-B3B7-1760D39A0C40}" type="slidenum">
+              <a:rPr lang="de-DE" smtClean="0"/>
+              <a:t>17</a:t>
             </a:fld>
             <a:endParaRPr lang="de-DE"/>
           </a:p>
@@ -4975,7 +5937,67 @@
             <a:pPr algn="l"/>
             <a:r>
               <a:rPr lang="de-DE" dirty="0" smtClean="0"/>
-              <a:t>Auswertung</a:t>
+              <a:t>Vergleich Cluster-Update und Metropolis</a:t>
+            </a:r>
+            <a:endParaRPr lang="de-DE" dirty="0"/>
+          </a:p>
+        </p:txBody>
+      </p:sp>
+      <p:sp>
+        <p:nvSpPr>
+          <p:cNvPr id="2" name="Textfeld 1"/>
+          <p:cNvSpPr txBox="1"/>
+          <p:nvPr/>
+        </p:nvSpPr>
+        <p:spPr>
+          <a:xfrm>
+            <a:off x="1547664" y="4756500"/>
+            <a:ext cx="1600053" cy="369332"/>
+          </a:xfrm>
+          <a:prstGeom prst="rect">
+            <a:avLst/>
+          </a:prstGeom>
+          <a:noFill/>
+        </p:spPr>
+        <p:txBody>
+          <a:bodyPr wrap="none" rtlCol="0">
+            <a:spAutoFit/>
+          </a:bodyPr>
+          <a:lstStyle/>
+          <a:p>
+            <a:r>
+              <a:rPr lang="de-DE" dirty="0" smtClean="0"/>
+              <a:t>Cluster-Update</a:t>
+            </a:r>
+            <a:endParaRPr lang="de-DE" dirty="0"/>
+          </a:p>
+        </p:txBody>
+      </p:sp>
+      <p:sp>
+        <p:nvSpPr>
+          <p:cNvPr id="3" name="Textfeld 2"/>
+          <p:cNvSpPr txBox="1"/>
+          <p:nvPr/>
+        </p:nvSpPr>
+        <p:spPr>
+          <a:xfrm>
+            <a:off x="6412695" y="4756500"/>
+            <a:ext cx="1210460" cy="369332"/>
+          </a:xfrm>
+          <a:prstGeom prst="rect">
+            <a:avLst/>
+          </a:prstGeom>
+          <a:noFill/>
+        </p:spPr>
+        <p:txBody>
+          <a:bodyPr wrap="none" rtlCol="0">
+            <a:spAutoFit/>
+          </a:bodyPr>
+          <a:lstStyle/>
+          <a:p>
+            <a:r>
+              <a:rPr lang="de-DE" dirty="0" smtClean="0"/>
+              <a:t>Metropolis</a:t>
             </a:r>
             <a:endParaRPr lang="de-DE" dirty="0"/>
           </a:p>
@@ -5001,7 +6023,7 @@
 </p:sld>
 </file>
 
-<file path=ppt/slides/slide16.xml><?xml version="1.0" encoding="utf-8"?>
+<file path=ppt/slides/slide18.xml><?xml version="1.0" encoding="utf-8"?>
 <p:sld xmlns:a="http://schemas.openxmlformats.org/drawingml/2006/main" xmlns:r="http://schemas.openxmlformats.org/officeDocument/2006/relationships" xmlns:p="http://schemas.openxmlformats.org/presentationml/2006/main">
   <p:cSld>
     <p:spTree>
@@ -5058,7 +6080,7 @@
           <a:p>
             <a:fld id="{6C7B5FFE-6139-497F-B3B7-1760D39A0C40}" type="slidenum">
               <a:rPr lang="de-DE" smtClean="0"/>
-              <a:t>16</a:t>
+              <a:t>18</a:t>
             </a:fld>
             <a:endParaRPr lang="de-DE"/>
           </a:p>
@@ -5175,6 +6197,66 @@
           </a:p>
         </p:txBody>
       </p:sp>
+      <p:sp>
+        <p:nvSpPr>
+          <p:cNvPr id="2" name="Textfeld 1"/>
+          <p:cNvSpPr txBox="1"/>
+          <p:nvPr/>
+        </p:nvSpPr>
+        <p:spPr>
+          <a:xfrm>
+            <a:off x="1475656" y="4838195"/>
+            <a:ext cx="1600053" cy="369332"/>
+          </a:xfrm>
+          <a:prstGeom prst="rect">
+            <a:avLst/>
+          </a:prstGeom>
+          <a:noFill/>
+        </p:spPr>
+        <p:txBody>
+          <a:bodyPr wrap="none" rtlCol="0">
+            <a:spAutoFit/>
+          </a:bodyPr>
+          <a:lstStyle/>
+          <a:p>
+            <a:r>
+              <a:rPr lang="de-DE" dirty="0" smtClean="0"/>
+              <a:t>Cluster-Update</a:t>
+            </a:r>
+            <a:endParaRPr lang="de-DE" dirty="0"/>
+          </a:p>
+        </p:txBody>
+      </p:sp>
+      <p:sp>
+        <p:nvSpPr>
+          <p:cNvPr id="8" name="Textfeld 7"/>
+          <p:cNvSpPr txBox="1"/>
+          <p:nvPr/>
+        </p:nvSpPr>
+        <p:spPr>
+          <a:xfrm>
+            <a:off x="6227361" y="4838195"/>
+            <a:ext cx="1210460" cy="369332"/>
+          </a:xfrm>
+          <a:prstGeom prst="rect">
+            <a:avLst/>
+          </a:prstGeom>
+          <a:noFill/>
+        </p:spPr>
+        <p:txBody>
+          <a:bodyPr wrap="none" rtlCol="0">
+            <a:spAutoFit/>
+          </a:bodyPr>
+          <a:lstStyle/>
+          <a:p>
+            <a:r>
+              <a:rPr lang="de-DE" dirty="0" smtClean="0"/>
+              <a:t>Metropolis</a:t>
+            </a:r>
+            <a:endParaRPr lang="de-DE" dirty="0"/>
+          </a:p>
+        </p:txBody>
+      </p:sp>
     </p:spTree>
     <p:extLst>
       <p:ext uri="{BB962C8B-B14F-4D97-AF65-F5344CB8AC3E}">
@@ -5191,6 +6273,543 @@
         <p:cTn id="1" dur="indefinite" restart="never" nodeType="tmRoot"/>
       </p:par>
     </p:tnLst>
+  </p:timing>
+</p:sld>
+</file>
+
+<file path=ppt/slides/slide19.xml><?xml version="1.0" encoding="utf-8"?>
+<p:sld xmlns:a="http://schemas.openxmlformats.org/drawingml/2006/main" xmlns:r="http://schemas.openxmlformats.org/officeDocument/2006/relationships" xmlns:p="http://schemas.openxmlformats.org/presentationml/2006/main">
+  <p:cSld>
+    <p:spTree>
+      <p:nvGrpSpPr>
+        <p:cNvPr id="1" name=""/>
+        <p:cNvGrpSpPr/>
+        <p:nvPr/>
+      </p:nvGrpSpPr>
+      <p:grpSpPr>
+        <a:xfrm>
+          <a:off x="0" y="0"/>
+          <a:ext cx="0" cy="0"/>
+          <a:chOff x="0" y="0"/>
+          <a:chExt cx="0" cy="0"/>
+        </a:xfrm>
+      </p:grpSpPr>
+      <p:sp>
+        <p:nvSpPr>
+          <p:cNvPr id="3" name="Inhaltsplatzhalter 2"/>
+          <p:cNvSpPr>
+            <a:spLocks noGrp="1"/>
+          </p:cNvSpPr>
+          <p:nvPr>
+            <p:ph idx="1"/>
+          </p:nvPr>
+        </p:nvSpPr>
+        <p:spPr/>
+        <p:txBody>
+          <a:bodyPr/>
+          <a:lstStyle/>
+          <a:p>
+            <a:r>
+              <a:rPr lang="de-DE" dirty="0" smtClean="0"/>
+              <a:t>Vorteile</a:t>
+            </a:r>
+          </a:p>
+          <a:p>
+            <a:pPr lvl="1"/>
+            <a:r>
+              <a:rPr lang="de-DE" dirty="0" smtClean="0"/>
+              <a:t>Schnelle Konvergenz bei </a:t>
+            </a:r>
+            <a:r>
+              <a:rPr lang="de-DE" dirty="0" err="1" smtClean="0"/>
+              <a:t>Tc</a:t>
+            </a:r>
+            <a:endParaRPr lang="de-DE" dirty="0" smtClean="0"/>
+          </a:p>
+          <a:p>
+            <a:pPr lvl="1"/>
+            <a:r>
+              <a:rPr lang="de-DE" dirty="0" smtClean="0"/>
+              <a:t>Sehr Effizient</a:t>
+            </a:r>
+          </a:p>
+          <a:p>
+            <a:pPr lvl="1"/>
+            <a:r>
+              <a:rPr lang="de-DE" dirty="0" smtClean="0"/>
+              <a:t>Verhindern von Verklemmungen</a:t>
+            </a:r>
+          </a:p>
+          <a:p>
+            <a:r>
+              <a:rPr lang="de-DE" dirty="0" smtClean="0"/>
+              <a:t>Nachteile</a:t>
+            </a:r>
+          </a:p>
+          <a:p>
+            <a:pPr lvl="1"/>
+            <a:r>
+              <a:rPr lang="de-DE" dirty="0" smtClean="0"/>
+              <a:t>Nur </a:t>
+            </a:r>
+            <a:r>
+              <a:rPr lang="de-DE" dirty="0" err="1" smtClean="0"/>
+              <a:t>Absolutbetrag</a:t>
+            </a:r>
+            <a:r>
+              <a:rPr lang="de-DE" dirty="0" smtClean="0"/>
+              <a:t> der Magnetisierung</a:t>
+            </a:r>
+          </a:p>
+          <a:p>
+            <a:pPr lvl="1"/>
+            <a:r>
+              <a:rPr lang="de-DE" dirty="0" smtClean="0"/>
+              <a:t>Schlecht, wenn von </a:t>
+            </a:r>
+            <a:r>
+              <a:rPr lang="de-DE" dirty="0" err="1" smtClean="0"/>
+              <a:t>Tc</a:t>
+            </a:r>
+            <a:r>
+              <a:rPr lang="de-DE" dirty="0" smtClean="0"/>
+              <a:t> entfernt</a:t>
+            </a:r>
+          </a:p>
+          <a:p>
+            <a:pPr lvl="1"/>
+            <a:r>
+              <a:rPr lang="de-DE" dirty="0" smtClean="0"/>
+              <a:t>Kein äußeres Magnetfeld</a:t>
+            </a:r>
+            <a:endParaRPr lang="de-DE" dirty="0"/>
+          </a:p>
+        </p:txBody>
+      </p:sp>
+      <p:sp>
+        <p:nvSpPr>
+          <p:cNvPr id="4" name="Fußzeilenplatzhalter 3"/>
+          <p:cNvSpPr>
+            <a:spLocks noGrp="1"/>
+          </p:cNvSpPr>
+          <p:nvPr>
+            <p:ph type="ftr" sz="quarter" idx="11"/>
+          </p:nvPr>
+        </p:nvSpPr>
+        <p:spPr/>
+        <p:txBody>
+          <a:bodyPr/>
+          <a:lstStyle/>
+          <a:p>
+            <a:r>
+              <a:rPr lang="de-DE" smtClean="0"/>
+              <a:t>Niek Andresen Robert Hartmann Jan Fabian Schmid</a:t>
+            </a:r>
+            <a:endParaRPr lang="de-DE"/>
+          </a:p>
+        </p:txBody>
+      </p:sp>
+      <p:sp>
+        <p:nvSpPr>
+          <p:cNvPr id="5" name="Foliennummernplatzhalter 4"/>
+          <p:cNvSpPr>
+            <a:spLocks noGrp="1"/>
+          </p:cNvSpPr>
+          <p:nvPr>
+            <p:ph type="sldNum" sz="quarter" idx="12"/>
+          </p:nvPr>
+        </p:nvSpPr>
+        <p:spPr/>
+        <p:txBody>
+          <a:bodyPr/>
+          <a:lstStyle/>
+          <a:p>
+            <a:fld id="{6C7B5FFE-6139-497F-B3B7-1760D39A0C40}" type="slidenum">
+              <a:rPr lang="de-DE" smtClean="0"/>
+              <a:t>19</a:t>
+            </a:fld>
+            <a:endParaRPr lang="de-DE"/>
+          </a:p>
+        </p:txBody>
+      </p:sp>
+      <p:sp>
+        <p:nvSpPr>
+          <p:cNvPr id="6" name="Titel 1"/>
+          <p:cNvSpPr txBox="1">
+            <a:spLocks/>
+          </p:cNvSpPr>
+          <p:nvPr/>
+        </p:nvSpPr>
+        <p:spPr>
+          <a:xfrm>
+            <a:off x="0" y="0"/>
+            <a:ext cx="9144000" cy="548680"/>
+          </a:xfrm>
+          <a:prstGeom prst="rect">
+            <a:avLst/>
+          </a:prstGeom>
+          <a:solidFill>
+            <a:schemeClr val="accent1">
+              <a:alpha val="82000"/>
+            </a:schemeClr>
+          </a:solidFill>
+        </p:spPr>
+        <p:txBody>
+          <a:bodyPr vert="horz" lIns="91440" tIns="45720" rIns="91440" bIns="45720" rtlCol="0" anchor="ctr">
+            <a:normAutofit fontScale="82500" lnSpcReduction="20000"/>
+          </a:bodyPr>
+          <a:lstStyle>
+            <a:lvl1pPr algn="ctr" defTabSz="914400" rtl="0" eaLnBrk="1" latinLnBrk="0" hangingPunct="1">
+              <a:spcBef>
+                <a:spcPct val="0"/>
+              </a:spcBef>
+              <a:buNone/>
+              <a:defRPr sz="4400" kern="1200">
+                <a:solidFill>
+                  <a:schemeClr val="tx1"/>
+                </a:solidFill>
+                <a:latin typeface="+mj-lt"/>
+                <a:ea typeface="+mj-ea"/>
+                <a:cs typeface="+mj-cs"/>
+              </a:defRPr>
+            </a:lvl1pPr>
+          </a:lstStyle>
+          <a:p>
+            <a:pPr algn="l"/>
+            <a:r>
+              <a:rPr lang="de-DE" dirty="0" smtClean="0"/>
+              <a:t>Vor- und Nachteile vom Cluster-Update</a:t>
+            </a:r>
+            <a:endParaRPr lang="de-DE" dirty="0"/>
+          </a:p>
+        </p:txBody>
+      </p:sp>
+    </p:spTree>
+    <p:extLst>
+      <p:ext uri="{BB962C8B-B14F-4D97-AF65-F5344CB8AC3E}">
+        <p14:creationId xmlns:p14="http://schemas.microsoft.com/office/powerpoint/2010/main" val="1554128922"/>
+      </p:ext>
+    </p:extLst>
+  </p:cSld>
+  <p:clrMapOvr>
+    <a:masterClrMapping/>
+  </p:clrMapOvr>
+  <p:timing>
+    <p:tnLst>
+      <p:par>
+        <p:cTn id="1" dur="indefinite" restart="never" nodeType="tmRoot">
+          <p:childTnLst>
+            <p:seq concurrent="1" nextAc="seek">
+              <p:cTn id="2" dur="indefinite" nodeType="mainSeq">
+                <p:childTnLst>
+                  <p:par>
+                    <p:cTn id="3" fill="hold">
+                      <p:stCondLst>
+                        <p:cond delay="indefinite"/>
+                      </p:stCondLst>
+                      <p:childTnLst>
+                        <p:par>
+                          <p:cTn id="4" fill="hold">
+                            <p:stCondLst>
+                              <p:cond delay="0"/>
+                            </p:stCondLst>
+                            <p:childTnLst>
+                              <p:par>
+                                <p:cTn id="5" presetID="1" presetClass="entr" presetSubtype="0" fill="hold" grpId="0" nodeType="clickEffect">
+                                  <p:stCondLst>
+                                    <p:cond delay="0"/>
+                                  </p:stCondLst>
+                                  <p:childTnLst>
+                                    <p:set>
+                                      <p:cBhvr>
+                                        <p:cTn id="6" dur="1" fill="hold">
+                                          <p:stCondLst>
+                                            <p:cond delay="0"/>
+                                          </p:stCondLst>
+                                        </p:cTn>
+                                        <p:tgtEl>
+                                          <p:spTgt spid="3">
+                                            <p:txEl>
+                                              <p:pRg st="0" end="0"/>
+                                            </p:txEl>
+                                          </p:spTgt>
+                                        </p:tgtEl>
+                                        <p:attrNameLst>
+                                          <p:attrName>style.visibility</p:attrName>
+                                        </p:attrNameLst>
+                                      </p:cBhvr>
+                                      <p:to>
+                                        <p:strVal val="visible"/>
+                                      </p:to>
+                                    </p:set>
+                                  </p:childTnLst>
+                                </p:cTn>
+                              </p:par>
+                              <p:par>
+                                <p:cTn id="7" presetID="1" presetClass="entr" presetSubtype="0" fill="hold" grpId="0" nodeType="withEffect">
+                                  <p:stCondLst>
+                                    <p:cond delay="0"/>
+                                  </p:stCondLst>
+                                  <p:childTnLst>
+                                    <p:set>
+                                      <p:cBhvr>
+                                        <p:cTn id="8" dur="1" fill="hold">
+                                          <p:stCondLst>
+                                            <p:cond delay="0"/>
+                                          </p:stCondLst>
+                                        </p:cTn>
+                                        <p:tgtEl>
+                                          <p:spTgt spid="3">
+                                            <p:txEl>
+                                              <p:pRg st="1" end="1"/>
+                                            </p:txEl>
+                                          </p:spTgt>
+                                        </p:tgtEl>
+                                        <p:attrNameLst>
+                                          <p:attrName>style.visibility</p:attrName>
+                                        </p:attrNameLst>
+                                      </p:cBhvr>
+                                      <p:to>
+                                        <p:strVal val="visible"/>
+                                      </p:to>
+                                    </p:set>
+                                  </p:childTnLst>
+                                </p:cTn>
+                              </p:par>
+                              <p:par>
+                                <p:cTn id="9" presetID="1" presetClass="entr" presetSubtype="0" fill="hold" grpId="0" nodeType="withEffect">
+                                  <p:stCondLst>
+                                    <p:cond delay="0"/>
+                                  </p:stCondLst>
+                                  <p:childTnLst>
+                                    <p:set>
+                                      <p:cBhvr>
+                                        <p:cTn id="10" dur="1" fill="hold">
+                                          <p:stCondLst>
+                                            <p:cond delay="0"/>
+                                          </p:stCondLst>
+                                        </p:cTn>
+                                        <p:tgtEl>
+                                          <p:spTgt spid="3">
+                                            <p:txEl>
+                                              <p:pRg st="2" end="2"/>
+                                            </p:txEl>
+                                          </p:spTgt>
+                                        </p:tgtEl>
+                                        <p:attrNameLst>
+                                          <p:attrName>style.visibility</p:attrName>
+                                        </p:attrNameLst>
+                                      </p:cBhvr>
+                                      <p:to>
+                                        <p:strVal val="visible"/>
+                                      </p:to>
+                                    </p:set>
+                                  </p:childTnLst>
+                                </p:cTn>
+                              </p:par>
+                              <p:par>
+                                <p:cTn id="11" presetID="1" presetClass="entr" presetSubtype="0" fill="hold" grpId="0" nodeType="withEffect">
+                                  <p:stCondLst>
+                                    <p:cond delay="0"/>
+                                  </p:stCondLst>
+                                  <p:childTnLst>
+                                    <p:set>
+                                      <p:cBhvr>
+                                        <p:cTn id="12" dur="1" fill="hold">
+                                          <p:stCondLst>
+                                            <p:cond delay="0"/>
+                                          </p:stCondLst>
+                                        </p:cTn>
+                                        <p:tgtEl>
+                                          <p:spTgt spid="3">
+                                            <p:txEl>
+                                              <p:pRg st="3" end="3"/>
+                                            </p:txEl>
+                                          </p:spTgt>
+                                        </p:tgtEl>
+                                        <p:attrNameLst>
+                                          <p:attrName>style.visibility</p:attrName>
+                                        </p:attrNameLst>
+                                      </p:cBhvr>
+                                      <p:to>
+                                        <p:strVal val="visible"/>
+                                      </p:to>
+                                    </p:set>
+                                  </p:childTnLst>
+                                </p:cTn>
+                              </p:par>
+                            </p:childTnLst>
+                          </p:cTn>
+                        </p:par>
+                      </p:childTnLst>
+                    </p:cTn>
+                  </p:par>
+                  <p:par>
+                    <p:cTn id="13" fill="hold">
+                      <p:stCondLst>
+                        <p:cond delay="indefinite"/>
+                      </p:stCondLst>
+                      <p:childTnLst>
+                        <p:par>
+                          <p:cTn id="14" fill="hold">
+                            <p:stCondLst>
+                              <p:cond delay="0"/>
+                            </p:stCondLst>
+                            <p:childTnLst>
+                              <p:par>
+                                <p:cTn id="15" presetID="1" presetClass="entr" presetSubtype="0" fill="hold" grpId="0" nodeType="clickEffect">
+                                  <p:stCondLst>
+                                    <p:cond delay="0"/>
+                                  </p:stCondLst>
+                                  <p:childTnLst>
+                                    <p:set>
+                                      <p:cBhvr>
+                                        <p:cTn id="16" dur="1" fill="hold">
+                                          <p:stCondLst>
+                                            <p:cond delay="0"/>
+                                          </p:stCondLst>
+                                        </p:cTn>
+                                        <p:tgtEl>
+                                          <p:spTgt spid="3">
+                                            <p:txEl>
+                                              <p:pRg st="4" end="4"/>
+                                            </p:txEl>
+                                          </p:spTgt>
+                                        </p:tgtEl>
+                                        <p:attrNameLst>
+                                          <p:attrName>style.visibility</p:attrName>
+                                        </p:attrNameLst>
+                                      </p:cBhvr>
+                                      <p:to>
+                                        <p:strVal val="visible"/>
+                                      </p:to>
+                                    </p:set>
+                                  </p:childTnLst>
+                                </p:cTn>
+                              </p:par>
+                              <p:par>
+                                <p:cTn id="17" presetID="1" presetClass="entr" presetSubtype="0" fill="hold" grpId="0" nodeType="withEffect">
+                                  <p:stCondLst>
+                                    <p:cond delay="0"/>
+                                  </p:stCondLst>
+                                  <p:childTnLst>
+                                    <p:set>
+                                      <p:cBhvr>
+                                        <p:cTn id="18" dur="1" fill="hold">
+                                          <p:stCondLst>
+                                            <p:cond delay="0"/>
+                                          </p:stCondLst>
+                                        </p:cTn>
+                                        <p:tgtEl>
+                                          <p:spTgt spid="3">
+                                            <p:txEl>
+                                              <p:pRg st="5" end="5"/>
+                                            </p:txEl>
+                                          </p:spTgt>
+                                        </p:tgtEl>
+                                        <p:attrNameLst>
+                                          <p:attrName>style.visibility</p:attrName>
+                                        </p:attrNameLst>
+                                      </p:cBhvr>
+                                      <p:to>
+                                        <p:strVal val="visible"/>
+                                      </p:to>
+                                    </p:set>
+                                  </p:childTnLst>
+                                </p:cTn>
+                              </p:par>
+                              <p:par>
+                                <p:cTn id="19" presetID="1" presetClass="entr" presetSubtype="0" fill="hold" grpId="0" nodeType="withEffect">
+                                  <p:stCondLst>
+                                    <p:cond delay="0"/>
+                                  </p:stCondLst>
+                                  <p:childTnLst>
+                                    <p:set>
+                                      <p:cBhvr>
+                                        <p:cTn id="20" dur="1" fill="hold">
+                                          <p:stCondLst>
+                                            <p:cond delay="0"/>
+                                          </p:stCondLst>
+                                        </p:cTn>
+                                        <p:tgtEl>
+                                          <p:spTgt spid="3">
+                                            <p:txEl>
+                                              <p:pRg st="6" end="6"/>
+                                            </p:txEl>
+                                          </p:spTgt>
+                                        </p:tgtEl>
+                                        <p:attrNameLst>
+                                          <p:attrName>style.visibility</p:attrName>
+                                        </p:attrNameLst>
+                                      </p:cBhvr>
+                                      <p:to>
+                                        <p:strVal val="visible"/>
+                                      </p:to>
+                                    </p:set>
+                                  </p:childTnLst>
+                                </p:cTn>
+                              </p:par>
+                              <p:par>
+                                <p:cTn id="21" presetID="1" presetClass="entr" presetSubtype="0" fill="hold" grpId="0" nodeType="withEffect">
+                                  <p:stCondLst>
+                                    <p:cond delay="0"/>
+                                  </p:stCondLst>
+                                  <p:childTnLst>
+                                    <p:set>
+                                      <p:cBhvr>
+                                        <p:cTn id="22" dur="1" fill="hold">
+                                          <p:stCondLst>
+                                            <p:cond delay="0"/>
+                                          </p:stCondLst>
+                                        </p:cTn>
+                                        <p:tgtEl>
+                                          <p:spTgt spid="3">
+                                            <p:txEl>
+                                              <p:pRg st="7" end="7"/>
+                                            </p:txEl>
+                                          </p:spTgt>
+                                        </p:tgtEl>
+                                        <p:attrNameLst>
+                                          <p:attrName>style.visibility</p:attrName>
+                                        </p:attrNameLst>
+                                      </p:cBhvr>
+                                      <p:to>
+                                        <p:strVal val="visible"/>
+                                      </p:to>
+                                    </p:set>
+                                  </p:childTnLst>
+                                </p:cTn>
+                              </p:par>
+                            </p:childTnLst>
+                          </p:cTn>
+                        </p:par>
+                      </p:childTnLst>
+                    </p:cTn>
+                  </p:par>
+                </p:childTnLst>
+              </p:cTn>
+              <p:prevCondLst>
+                <p:cond evt="onPrev" delay="0">
+                  <p:tgtEl>
+                    <p:sldTgt/>
+                  </p:tgtEl>
+                </p:cond>
+              </p:prevCondLst>
+              <p:nextCondLst>
+                <p:cond evt="onNext" delay="0">
+                  <p:tgtEl>
+                    <p:sldTgt/>
+                  </p:tgtEl>
+                </p:cond>
+              </p:nextCondLst>
+            </p:seq>
+          </p:childTnLst>
+        </p:cTn>
+      </p:par>
+    </p:tnLst>
+    <p:bldLst>
+      <p:bldP spid="3" grpId="0" build="p"/>
+    </p:bldLst>
   </p:timing>
 </p:sld>
 </file>
@@ -5361,6 +6980,184 @@
     <p:extLst>
       <p:ext uri="{BB962C8B-B14F-4D97-AF65-F5344CB8AC3E}">
         <p14:creationId xmlns:p14="http://schemas.microsoft.com/office/powerpoint/2010/main" val="1504475077"/>
+      </p:ext>
+    </p:extLst>
+  </p:cSld>
+  <p:clrMapOvr>
+    <a:masterClrMapping/>
+  </p:clrMapOvr>
+  <p:timing>
+    <p:tnLst>
+      <p:par>
+        <p:cTn id="1" dur="indefinite" restart="never" nodeType="tmRoot"/>
+      </p:par>
+    </p:tnLst>
+  </p:timing>
+</p:sld>
+</file>
+
+<file path=ppt/slides/slide20.xml><?xml version="1.0" encoding="utf-8"?>
+<p:sld xmlns:a="http://schemas.openxmlformats.org/drawingml/2006/main" xmlns:r="http://schemas.openxmlformats.org/officeDocument/2006/relationships" xmlns:p="http://schemas.openxmlformats.org/presentationml/2006/main">
+  <p:cSld>
+    <p:spTree>
+      <p:nvGrpSpPr>
+        <p:cNvPr id="1" name=""/>
+        <p:cNvGrpSpPr/>
+        <p:nvPr/>
+      </p:nvGrpSpPr>
+      <p:grpSpPr>
+        <a:xfrm>
+          <a:off x="0" y="0"/>
+          <a:ext cx="0" cy="0"/>
+          <a:chOff x="0" y="0"/>
+          <a:chExt cx="0" cy="0"/>
+        </a:xfrm>
+      </p:grpSpPr>
+      <p:sp>
+        <p:nvSpPr>
+          <p:cNvPr id="3" name="Inhaltsplatzhalter 2"/>
+          <p:cNvSpPr>
+            <a:spLocks noGrp="1"/>
+          </p:cNvSpPr>
+          <p:nvPr>
+            <p:ph idx="1"/>
+          </p:nvPr>
+        </p:nvSpPr>
+        <p:spPr/>
+        <p:txBody>
+          <a:bodyPr/>
+          <a:lstStyle/>
+          <a:p>
+            <a:endParaRPr lang="de-DE" dirty="0" smtClean="0"/>
+          </a:p>
+          <a:p>
+            <a:endParaRPr lang="de-DE" dirty="0"/>
+          </a:p>
+          <a:p>
+            <a:endParaRPr lang="de-DE" dirty="0" smtClean="0"/>
+          </a:p>
+          <a:p>
+            <a:endParaRPr lang="de-DE" dirty="0"/>
+          </a:p>
+          <a:p>
+            <a:r>
+              <a:rPr lang="de-DE" dirty="0" smtClean="0"/>
+              <a:t>Cluster-Update muss </a:t>
+            </a:r>
+            <a:r>
+              <a:rPr lang="de-DE" dirty="0" err="1" smtClean="0"/>
+              <a:t>abgewägt</a:t>
+            </a:r>
+            <a:r>
+              <a:rPr lang="de-DE" dirty="0" smtClean="0"/>
+              <a:t> werden</a:t>
+            </a:r>
+            <a:endParaRPr lang="de-DE" dirty="0"/>
+          </a:p>
+        </p:txBody>
+      </p:sp>
+      <p:sp>
+        <p:nvSpPr>
+          <p:cNvPr id="4" name="Fußzeilenplatzhalter 3"/>
+          <p:cNvSpPr>
+            <a:spLocks noGrp="1"/>
+          </p:cNvSpPr>
+          <p:nvPr>
+            <p:ph type="ftr" sz="quarter" idx="11"/>
+          </p:nvPr>
+        </p:nvSpPr>
+        <p:spPr/>
+        <p:txBody>
+          <a:bodyPr/>
+          <a:lstStyle/>
+          <a:p>
+            <a:r>
+              <a:rPr lang="de-DE" smtClean="0"/>
+              <a:t>Niek Andresen Robert Hartmann Jan Fabian Schmid</a:t>
+            </a:r>
+            <a:endParaRPr lang="de-DE"/>
+          </a:p>
+        </p:txBody>
+      </p:sp>
+      <p:sp>
+        <p:nvSpPr>
+          <p:cNvPr id="5" name="Foliennummernplatzhalter 4"/>
+          <p:cNvSpPr>
+            <a:spLocks noGrp="1"/>
+          </p:cNvSpPr>
+          <p:nvPr>
+            <p:ph type="sldNum" sz="quarter" idx="12"/>
+          </p:nvPr>
+        </p:nvSpPr>
+        <p:spPr/>
+        <p:txBody>
+          <a:bodyPr/>
+          <a:lstStyle/>
+          <a:p>
+            <a:fld id="{6C7B5FFE-6139-497F-B3B7-1760D39A0C40}" type="slidenum">
+              <a:rPr lang="de-DE" smtClean="0"/>
+              <a:t>20</a:t>
+            </a:fld>
+            <a:endParaRPr lang="de-DE"/>
+          </a:p>
+        </p:txBody>
+      </p:sp>
+      <p:sp>
+        <p:nvSpPr>
+          <p:cNvPr id="6" name="Titel 1"/>
+          <p:cNvSpPr txBox="1">
+            <a:spLocks/>
+          </p:cNvSpPr>
+          <p:nvPr/>
+        </p:nvSpPr>
+        <p:spPr>
+          <a:xfrm>
+            <a:off x="0" y="0"/>
+            <a:ext cx="9144000" cy="548680"/>
+          </a:xfrm>
+          <a:prstGeom prst="rect">
+            <a:avLst/>
+          </a:prstGeom>
+          <a:solidFill>
+            <a:schemeClr val="accent1">
+              <a:alpha val="82000"/>
+            </a:schemeClr>
+          </a:solidFill>
+        </p:spPr>
+        <p:txBody>
+          <a:bodyPr vert="horz" lIns="91440" tIns="45720" rIns="91440" bIns="45720" rtlCol="0" anchor="ctr">
+            <a:normAutofit fontScale="82500" lnSpcReduction="20000"/>
+          </a:bodyPr>
+          <a:lstStyle>
+            <a:lvl1pPr algn="ctr" defTabSz="914400" rtl="0" eaLnBrk="1" latinLnBrk="0" hangingPunct="1">
+              <a:spcBef>
+                <a:spcPct val="0"/>
+              </a:spcBef>
+              <a:buNone/>
+              <a:defRPr sz="4400" kern="1200">
+                <a:solidFill>
+                  <a:schemeClr val="tx1"/>
+                </a:solidFill>
+                <a:latin typeface="+mj-lt"/>
+                <a:ea typeface="+mj-ea"/>
+                <a:cs typeface="+mj-cs"/>
+              </a:defRPr>
+            </a:lvl1pPr>
+          </a:lstStyle>
+          <a:p>
+            <a:pPr algn="l"/>
+            <a:r>
+              <a:rPr lang="de-DE" dirty="0" smtClean="0"/>
+              <a:t>Fazit</a:t>
+            </a:r>
+            <a:endParaRPr lang="de-DE" dirty="0"/>
+          </a:p>
+        </p:txBody>
+      </p:sp>
+    </p:spTree>
+    <p:extLst>
+      <p:ext uri="{BB962C8B-B14F-4D97-AF65-F5344CB8AC3E}">
+        <p14:creationId xmlns:p14="http://schemas.microsoft.com/office/powerpoint/2010/main" val="69901818"/>
       </p:ext>
     </p:extLst>
   </p:cSld>

</xml_diff>